<commit_message>
Global edit project (add menu Autorezation)
</commit_message>
<xml_diff>
--- a/Decrypt and Ecrypt.pptx
+++ b/Decrypt and Ecrypt.pptx
@@ -5,7 +5,7 @@
     <p:sldMasterId id="2147483648" r:id="rId1"/>
   </p:sldMasterIdLst>
   <p:notesMasterIdLst>
-    <p:notesMasterId r:id="rId13"/>
+    <p:notesMasterId r:id="rId17"/>
   </p:notesMasterIdLst>
   <p:sldIdLst>
     <p:sldId id="256" r:id="rId2"/>
@@ -15,10 +15,14 @@
     <p:sldId id="261" r:id="rId6"/>
     <p:sldId id="266" r:id="rId7"/>
     <p:sldId id="260" r:id="rId8"/>
-    <p:sldId id="263" r:id="rId9"/>
-    <p:sldId id="264" r:id="rId10"/>
-    <p:sldId id="265" r:id="rId11"/>
-    <p:sldId id="267" r:id="rId12"/>
+    <p:sldId id="268" r:id="rId9"/>
+    <p:sldId id="263" r:id="rId10"/>
+    <p:sldId id="264" r:id="rId11"/>
+    <p:sldId id="270" r:id="rId12"/>
+    <p:sldId id="269" r:id="rId13"/>
+    <p:sldId id="265" r:id="rId14"/>
+    <p:sldId id="271" r:id="rId15"/>
+    <p:sldId id="267" r:id="rId16"/>
   </p:sldIdLst>
   <p:sldSz cx="12192000" cy="6858000"/>
   <p:notesSz cx="6858000" cy="9144000"/>
@@ -129,9 +133,13 @@
             <p14:sldId id="261"/>
             <p14:sldId id="266"/>
             <p14:sldId id="260"/>
+            <p14:sldId id="268"/>
             <p14:sldId id="263"/>
             <p14:sldId id="264"/>
+            <p14:sldId id="270"/>
+            <p14:sldId id="269"/>
             <p14:sldId id="265"/>
+            <p14:sldId id="271"/>
             <p14:sldId id="267"/>
           </p14:sldIdLst>
         </p14:section>
@@ -229,7 +237,7 @@
           <a:p>
             <a:fld id="{F2016D71-C06B-46C6-A3C0-712855304E94}" type="datetimeFigureOut">
               <a:rPr lang="ru-RU" smtClean="0"/>
-              <a:t>29.10.2022</a:t>
+              <a:t>30.12.2022</a:t>
             </a:fld>
             <a:endParaRPr lang="ru-RU"/>
           </a:p>
@@ -643,7 +651,7 @@
           <a:p>
             <a:fld id="{53EA643E-9CF0-4062-BEAA-F37B950CEFA8}" type="datetimeFigureOut">
               <a:rPr lang="ru-RU" smtClean="0"/>
-              <a:t>29.10.2022</a:t>
+              <a:t>30.12.2022</a:t>
             </a:fld>
             <a:endParaRPr lang="ru-RU"/>
           </a:p>
@@ -841,7 +849,7 @@
           <a:p>
             <a:fld id="{53EA643E-9CF0-4062-BEAA-F37B950CEFA8}" type="datetimeFigureOut">
               <a:rPr lang="ru-RU" smtClean="0"/>
-              <a:t>29.10.2022</a:t>
+              <a:t>30.12.2022</a:t>
             </a:fld>
             <a:endParaRPr lang="ru-RU"/>
           </a:p>
@@ -1049,7 +1057,7 @@
           <a:p>
             <a:fld id="{53EA643E-9CF0-4062-BEAA-F37B950CEFA8}" type="datetimeFigureOut">
               <a:rPr lang="ru-RU" smtClean="0"/>
-              <a:t>29.10.2022</a:t>
+              <a:t>30.12.2022</a:t>
             </a:fld>
             <a:endParaRPr lang="ru-RU"/>
           </a:p>
@@ -1247,7 +1255,7 @@
           <a:p>
             <a:fld id="{53EA643E-9CF0-4062-BEAA-F37B950CEFA8}" type="datetimeFigureOut">
               <a:rPr lang="ru-RU" smtClean="0"/>
-              <a:t>29.10.2022</a:t>
+              <a:t>30.12.2022</a:t>
             </a:fld>
             <a:endParaRPr lang="ru-RU"/>
           </a:p>
@@ -1522,7 +1530,7 @@
           <a:p>
             <a:fld id="{53EA643E-9CF0-4062-BEAA-F37B950CEFA8}" type="datetimeFigureOut">
               <a:rPr lang="ru-RU" smtClean="0"/>
-              <a:t>29.10.2022</a:t>
+              <a:t>30.12.2022</a:t>
             </a:fld>
             <a:endParaRPr lang="ru-RU"/>
           </a:p>
@@ -1787,7 +1795,7 @@
           <a:p>
             <a:fld id="{53EA643E-9CF0-4062-BEAA-F37B950CEFA8}" type="datetimeFigureOut">
               <a:rPr lang="ru-RU" smtClean="0"/>
-              <a:t>29.10.2022</a:t>
+              <a:t>30.12.2022</a:t>
             </a:fld>
             <a:endParaRPr lang="ru-RU"/>
           </a:p>
@@ -2199,7 +2207,7 @@
           <a:p>
             <a:fld id="{53EA643E-9CF0-4062-BEAA-F37B950CEFA8}" type="datetimeFigureOut">
               <a:rPr lang="ru-RU" smtClean="0"/>
-              <a:t>29.10.2022</a:t>
+              <a:t>30.12.2022</a:t>
             </a:fld>
             <a:endParaRPr lang="ru-RU"/>
           </a:p>
@@ -2340,7 +2348,7 @@
           <a:p>
             <a:fld id="{53EA643E-9CF0-4062-BEAA-F37B950CEFA8}" type="datetimeFigureOut">
               <a:rPr lang="ru-RU" smtClean="0"/>
-              <a:t>29.10.2022</a:t>
+              <a:t>30.12.2022</a:t>
             </a:fld>
             <a:endParaRPr lang="ru-RU"/>
           </a:p>
@@ -2453,7 +2461,7 @@
           <a:p>
             <a:fld id="{53EA643E-9CF0-4062-BEAA-F37B950CEFA8}" type="datetimeFigureOut">
               <a:rPr lang="ru-RU" smtClean="0"/>
-              <a:t>29.10.2022</a:t>
+              <a:t>30.12.2022</a:t>
             </a:fld>
             <a:endParaRPr lang="ru-RU"/>
           </a:p>
@@ -2764,7 +2772,7 @@
           <a:p>
             <a:fld id="{53EA643E-9CF0-4062-BEAA-F37B950CEFA8}" type="datetimeFigureOut">
               <a:rPr lang="ru-RU" smtClean="0"/>
-              <a:t>29.10.2022</a:t>
+              <a:t>30.12.2022</a:t>
             </a:fld>
             <a:endParaRPr lang="ru-RU"/>
           </a:p>
@@ -3052,7 +3060,7 @@
           <a:p>
             <a:fld id="{53EA643E-9CF0-4062-BEAA-F37B950CEFA8}" type="datetimeFigureOut">
               <a:rPr lang="ru-RU" smtClean="0"/>
-              <a:t>29.10.2022</a:t>
+              <a:t>30.12.2022</a:t>
             </a:fld>
             <a:endParaRPr lang="ru-RU"/>
           </a:p>
@@ -3293,7 +3301,7 @@
           <a:p>
             <a:fld id="{53EA643E-9CF0-4062-BEAA-F37B950CEFA8}" type="datetimeFigureOut">
               <a:rPr lang="ru-RU" smtClean="0"/>
-              <a:t>29.10.2022</a:t>
+              <a:t>30.12.2022</a:t>
             </a:fld>
             <a:endParaRPr lang="ru-RU"/>
           </a:p>
@@ -4483,13 +4491,13 @@
   <p:clrMapOvr>
     <a:masterClrMapping/>
   </p:clrMapOvr>
-  <mc:AlternateContent xmlns:mc="http://schemas.openxmlformats.org/markup-compatibility/2006">
-    <mc:Choice xmlns:p14="http://schemas.microsoft.com/office/powerpoint/2010/main" Requires="p14">
+  <mc:AlternateContent xmlns:mc="http://schemas.openxmlformats.org/markup-compatibility/2006" xmlns:p14="http://schemas.microsoft.com/office/powerpoint/2010/main">
+    <mc:Choice Requires="p14">
       <p:transition spd="slow" p14:dur="3400">
         <p14:reveal/>
       </p:transition>
     </mc:Choice>
-    <mc:Fallback>
+    <mc:Fallback xmlns="">
       <p:transition spd="slow">
         <p:fade/>
       </p:transition>
@@ -4547,7 +4555,7 @@
         </p:nvSpPr>
         <p:spPr>
           <a:xfrm>
-            <a:off x="520147" y="270343"/>
+            <a:off x="467026" y="344145"/>
             <a:ext cx="10948147" cy="1121135"/>
           </a:xfrm>
         </p:spPr>
@@ -4558,113 +4566,262 @@
           <a:lstStyle/>
           <a:p>
             <a:pPr algn="ctr"/>
-            <a:r>
-              <a:rPr lang="ru-RU" sz="4800" b="1" dirty="0">
+            <a:br>
+              <a:rPr lang="ru-RU" b="1" dirty="0">
+                <a:solidFill>
+                  <a:schemeClr val="accent5">
+                    <a:lumMod val="60000"/>
+                    <a:lumOff val="40000"/>
+                  </a:schemeClr>
+                </a:solidFill>
+              </a:rPr>
+            </a:br>
+            <a:r>
+              <a:rPr lang="ru-RU" b="1" dirty="0">
                 <a:solidFill>
                   <a:srgbClr val="F4B183"/>
                 </a:solidFill>
-                <a:effectLst>
-                  <a:outerShdw blurRad="38100" dist="38100" dir="2700000" algn="tl">
-                    <a:srgbClr val="000000">
-                      <a:alpha val="43137"/>
-                    </a:srgbClr>
-                  </a:outerShdw>
-                </a:effectLst>
                 <a:latin typeface="Arial Black" panose="020B0A04020102020204" pitchFamily="34" charset="0"/>
               </a:rPr>
-              <a:t>Заключение</a:t>
-            </a:r>
-          </a:p>
-        </p:txBody>
-      </p:sp>
-      <p:sp>
-        <p:nvSpPr>
-          <p:cNvPr id="4" name="Объект 3">
-            <a:extLst>
-              <a:ext uri="{FF2B5EF4-FFF2-40B4-BE49-F238E27FC236}">
-                <a16:creationId xmlns:a16="http://schemas.microsoft.com/office/drawing/2014/main" id="{369DC6B1-F77B-6C08-3543-89B96F25F6D5}"/>
-              </a:ext>
-            </a:extLst>
-          </p:cNvPr>
-          <p:cNvSpPr>
-            <a:spLocks noGrp="1"/>
-          </p:cNvSpPr>
+              <a:t>Объяснение реализации проекта в коде</a:t>
+            </a:r>
+            <a:br>
+              <a:rPr lang="ru-RU" b="1" dirty="0">
+                <a:solidFill>
+                  <a:srgbClr val="F4B183"/>
+                </a:solidFill>
+                <a:latin typeface="Arial Black" panose="020B0A04020102020204" pitchFamily="34" charset="0"/>
+              </a:rPr>
+            </a:br>
+            <a:r>
+              <a:rPr lang="en-US" b="1" dirty="0" err="1">
+                <a:solidFill>
+                  <a:srgbClr val="F4B183"/>
+                </a:solidFill>
+                <a:latin typeface="Arial Black" panose="020B0A04020102020204" pitchFamily="34" charset="0"/>
+              </a:rPr>
+              <a:t>Descrypt_and_Encrypt</a:t>
+            </a:r>
+            <a:br>
+              <a:rPr lang="ru-RU" b="1" dirty="0">
+                <a:solidFill>
+                  <a:schemeClr val="accent5">
+                    <a:lumMod val="60000"/>
+                    <a:lumOff val="40000"/>
+                  </a:schemeClr>
+                </a:solidFill>
+              </a:rPr>
+            </a:br>
+            <a:endParaRPr lang="ru-RU" b="1" dirty="0">
+              <a:solidFill>
+                <a:schemeClr val="accent2">
+                  <a:lumMod val="40000"/>
+                  <a:lumOff val="60000"/>
+                </a:schemeClr>
+              </a:solidFill>
+              <a:effectLst>
+                <a:outerShdw blurRad="38100" dist="38100" dir="2700000" algn="tl">
+                  <a:srgbClr val="000000">
+                    <a:alpha val="43137"/>
+                  </a:srgbClr>
+                </a:outerShdw>
+              </a:effectLst>
+              <a:latin typeface="Arial Black" panose="020B0A04020102020204" pitchFamily="34" charset="0"/>
+            </a:endParaRPr>
+          </a:p>
+        </p:txBody>
+      </p:sp>
+      <p:pic>
+        <p:nvPicPr>
+          <p:cNvPr id="8" name="Объект 7">
+            <a:extLst>
+              <a:ext uri="{FF2B5EF4-FFF2-40B4-BE49-F238E27FC236}">
+                <a16:creationId xmlns:a16="http://schemas.microsoft.com/office/drawing/2014/main" id="{BB23FC14-7BE2-BD4D-7FD9-A206B214C100}"/>
+              </a:ext>
+            </a:extLst>
+          </p:cNvPr>
+          <p:cNvPicPr>
+            <a:picLocks noGrp="1" noChangeAspect="1"/>
+          </p:cNvPicPr>
           <p:nvPr>
             <p:ph idx="1"/>
           </p:nvPr>
-        </p:nvSpPr>
+        </p:nvPicPr>
+        <p:blipFill>
+          <a:blip r:embed="rId3"/>
+          <a:stretch>
+            <a:fillRect/>
+          </a:stretch>
+        </p:blipFill>
         <p:spPr>
           <a:xfrm>
-            <a:off x="400878" y="1622869"/>
-            <a:ext cx="10515600" cy="4964788"/>
+            <a:off x="381519" y="1764658"/>
+            <a:ext cx="4314825" cy="1733550"/>
           </a:xfrm>
+          <a:prstGeom prst="roundRect">
+            <a:avLst>
+              <a:gd name="adj" fmla="val 8594"/>
+            </a:avLst>
+          </a:prstGeom>
+          <a:solidFill>
+            <a:srgbClr val="FFFFFF">
+              <a:shade val="85000"/>
+            </a:srgbClr>
+          </a:solidFill>
+          <a:ln>
+            <a:noFill/>
+          </a:ln>
+          <a:effectLst>
+            <a:reflection blurRad="12700" stA="38000" endPos="28000" dist="5000" dir="5400000" sy="-100000" algn="bl" rotWithShape="0"/>
+          </a:effectLst>
         </p:spPr>
-        <p:txBody>
-          <a:bodyPr>
-            <a:normAutofit/>
-          </a:bodyPr>
-          <a:lstStyle/>
-          <a:p>
-            <a:pPr marL="0" indent="0" algn="just">
-              <a:buNone/>
-            </a:pPr>
-            <a:r>
-              <a:rPr lang="ru-RU" b="1" dirty="0">
-                <a:solidFill>
-                  <a:srgbClr val="E69348"/>
-                </a:solidFill>
-              </a:rPr>
-              <a:t>Реализация проекта мне очень понравилась. Был счастлив, что снова вернулся к шифрованию файлов и ключам </a:t>
-            </a:r>
-            <a:r>
-              <a:rPr lang="en-US" b="1" dirty="0">
-                <a:solidFill>
-                  <a:srgbClr val="E69348"/>
-                </a:solidFill>
-              </a:rPr>
-              <a:t>API</a:t>
-            </a:r>
-            <a:r>
-              <a:rPr lang="ru-RU" b="1" dirty="0">
-                <a:solidFill>
-                  <a:srgbClr val="E69348"/>
-                </a:solidFill>
-              </a:rPr>
-              <a:t> которые создавали в прошлом для меня большую историю. Я создаю ключи в 50 символов, но если посмотреть в кодировку 1 биткоин, то он состоит из 32 символов (Биткоин – дорогая цифровая валюта)</a:t>
-            </a:r>
-          </a:p>
-          <a:p>
-            <a:pPr marL="0" indent="0" algn="just">
-              <a:buNone/>
-            </a:pPr>
-            <a:r>
-              <a:rPr lang="ru-RU" b="1" dirty="0">
-                <a:solidFill>
-                  <a:srgbClr val="B96519"/>
-                </a:solidFill>
-              </a:rPr>
-              <a:t>Возможности развития моего проекта является создание хостинга с большой Базой Данных в котором будут сохраняться | записываться файлы или данные загруженным пользователем в мою программу. Так можно будет легко отследить пользователя, изменив кодировку и размер файла ключа в код. Код уже будет взаимодействовать от хостинга. </a:t>
-            </a:r>
-          </a:p>
-        </p:txBody>
-      </p:sp>
+      </p:pic>
+      <p:pic>
+        <p:nvPicPr>
+          <p:cNvPr id="10" name="Рисунок 9">
+            <a:extLst>
+              <a:ext uri="{FF2B5EF4-FFF2-40B4-BE49-F238E27FC236}">
+                <a16:creationId xmlns:a16="http://schemas.microsoft.com/office/drawing/2014/main" id="{3F350791-AE4B-E6A9-B5A8-6D0906073CA2}"/>
+              </a:ext>
+            </a:extLst>
+          </p:cNvPr>
+          <p:cNvPicPr>
+            <a:picLocks noChangeAspect="1"/>
+          </p:cNvPicPr>
+          <p:nvPr/>
+        </p:nvPicPr>
+        <p:blipFill>
+          <a:blip r:embed="rId4"/>
+          <a:stretch>
+            <a:fillRect/>
+          </a:stretch>
+        </p:blipFill>
+        <p:spPr>
+          <a:xfrm>
+            <a:off x="4905375" y="1781354"/>
+            <a:ext cx="7286625" cy="3895725"/>
+          </a:xfrm>
+          <a:prstGeom prst="roundRect">
+            <a:avLst>
+              <a:gd name="adj" fmla="val 8594"/>
+            </a:avLst>
+          </a:prstGeom>
+          <a:solidFill>
+            <a:srgbClr val="FFFFFF">
+              <a:shade val="85000"/>
+            </a:srgbClr>
+          </a:solidFill>
+          <a:ln>
+            <a:noFill/>
+          </a:ln>
+          <a:effectLst>
+            <a:reflection blurRad="12700" stA="38000" endPos="28000" dist="5000" dir="5400000" sy="-100000" algn="bl" rotWithShape="0"/>
+          </a:effectLst>
+        </p:spPr>
+      </p:pic>
+      <p:pic>
+        <p:nvPicPr>
+          <p:cNvPr id="12" name="Рисунок 11">
+            <a:extLst>
+              <a:ext uri="{FF2B5EF4-FFF2-40B4-BE49-F238E27FC236}">
+                <a16:creationId xmlns:a16="http://schemas.microsoft.com/office/drawing/2014/main" id="{368CB8D0-B18F-8995-11F5-389B44BB763D}"/>
+              </a:ext>
+            </a:extLst>
+          </p:cNvPr>
+          <p:cNvPicPr>
+            <a:picLocks noChangeAspect="1"/>
+          </p:cNvPicPr>
+          <p:nvPr/>
+        </p:nvPicPr>
+        <p:blipFill>
+          <a:blip r:embed="rId5"/>
+          <a:stretch>
+            <a:fillRect/>
+          </a:stretch>
+        </p:blipFill>
+        <p:spPr>
+          <a:xfrm>
+            <a:off x="363659" y="3577721"/>
+            <a:ext cx="3314700" cy="1162050"/>
+          </a:xfrm>
+          <a:prstGeom prst="roundRect">
+            <a:avLst>
+              <a:gd name="adj" fmla="val 8594"/>
+            </a:avLst>
+          </a:prstGeom>
+          <a:solidFill>
+            <a:srgbClr val="FFFFFF">
+              <a:shade val="85000"/>
+            </a:srgbClr>
+          </a:solidFill>
+          <a:ln>
+            <a:noFill/>
+          </a:ln>
+          <a:effectLst>
+            <a:reflection blurRad="12700" stA="38000" endPos="28000" dist="5000" dir="5400000" sy="-100000" algn="bl" rotWithShape="0"/>
+          </a:effectLst>
+        </p:spPr>
+      </p:pic>
+      <p:pic>
+        <p:nvPicPr>
+          <p:cNvPr id="14" name="Рисунок 13">
+            <a:extLst>
+              <a:ext uri="{FF2B5EF4-FFF2-40B4-BE49-F238E27FC236}">
+                <a16:creationId xmlns:a16="http://schemas.microsoft.com/office/drawing/2014/main" id="{2CDEA45F-027F-6E84-5C3B-2452F66CA562}"/>
+              </a:ext>
+            </a:extLst>
+          </p:cNvPr>
+          <p:cNvPicPr>
+            <a:picLocks noChangeAspect="1"/>
+          </p:cNvPicPr>
+          <p:nvPr/>
+        </p:nvPicPr>
+        <p:blipFill>
+          <a:blip r:embed="rId6"/>
+          <a:stretch>
+            <a:fillRect/>
+          </a:stretch>
+        </p:blipFill>
+        <p:spPr>
+          <a:xfrm>
+            <a:off x="363659" y="4819284"/>
+            <a:ext cx="4476750" cy="866775"/>
+          </a:xfrm>
+          <a:prstGeom prst="roundRect">
+            <a:avLst>
+              <a:gd name="adj" fmla="val 8594"/>
+            </a:avLst>
+          </a:prstGeom>
+          <a:solidFill>
+            <a:srgbClr val="FFFFFF">
+              <a:shade val="85000"/>
+            </a:srgbClr>
+          </a:solidFill>
+          <a:ln>
+            <a:noFill/>
+          </a:ln>
+          <a:effectLst>
+            <a:reflection blurRad="12700" stA="38000" endPos="28000" dist="5000" dir="5400000" sy="-100000" algn="bl" rotWithShape="0"/>
+          </a:effectLst>
+        </p:spPr>
+      </p:pic>
     </p:spTree>
     <p:extLst>
       <p:ext uri="{BB962C8B-B14F-4D97-AF65-F5344CB8AC3E}">
-        <p14:creationId xmlns:p14="http://schemas.microsoft.com/office/powerpoint/2010/main" val="2365465500"/>
+        <p14:creationId xmlns:p14="http://schemas.microsoft.com/office/powerpoint/2010/main" val="498477423"/>
       </p:ext>
     </p:extLst>
   </p:cSld>
   <p:clrMapOvr>
     <a:masterClrMapping/>
   </p:clrMapOvr>
-  <mc:AlternateContent xmlns:mc="http://schemas.openxmlformats.org/markup-compatibility/2006">
-    <mc:Choice xmlns:p14="http://schemas.microsoft.com/office/powerpoint/2010/main" Requires="p14">
+  <mc:AlternateContent xmlns:mc="http://schemas.openxmlformats.org/markup-compatibility/2006" xmlns:p14="http://schemas.microsoft.com/office/powerpoint/2010/main">
+    <mc:Choice Requires="p14">
       <p:transition spd="slow" p14:dur="1600">
         <p14:prism isContent="1" isInverted="1"/>
       </p:transition>
     </mc:Choice>
-    <mc:Fallback>
+    <mc:Fallback xmlns="">
       <p:transition spd="slow">
         <p:fade/>
       </p:transition>
@@ -4722,6 +4879,972 @@
         </p:nvSpPr>
         <p:spPr>
           <a:xfrm>
+            <a:off x="467026" y="344145"/>
+            <a:ext cx="10948147" cy="1121135"/>
+          </a:xfrm>
+        </p:spPr>
+        <p:txBody>
+          <a:bodyPr>
+            <a:noAutofit/>
+          </a:bodyPr>
+          <a:lstStyle/>
+          <a:p>
+            <a:pPr algn="ctr"/>
+            <a:br>
+              <a:rPr lang="ru-RU" b="1" dirty="0">
+                <a:solidFill>
+                  <a:schemeClr val="accent5">
+                    <a:lumMod val="60000"/>
+                    <a:lumOff val="40000"/>
+                  </a:schemeClr>
+                </a:solidFill>
+              </a:rPr>
+            </a:br>
+            <a:r>
+              <a:rPr lang="ru-RU" b="1" dirty="0">
+                <a:solidFill>
+                  <a:srgbClr val="F4B183"/>
+                </a:solidFill>
+                <a:latin typeface="Arial Black" panose="020B0A04020102020204" pitchFamily="34" charset="0"/>
+              </a:rPr>
+              <a:t>Объяснение реализации проекта в коде</a:t>
+            </a:r>
+            <a:br>
+              <a:rPr lang="ru-RU" b="1" dirty="0">
+                <a:solidFill>
+                  <a:srgbClr val="F4B183"/>
+                </a:solidFill>
+                <a:latin typeface="Arial Black" panose="020B0A04020102020204" pitchFamily="34" charset="0"/>
+              </a:rPr>
+            </a:br>
+            <a:r>
+              <a:rPr lang="en-US" b="1" dirty="0" err="1">
+                <a:solidFill>
+                  <a:srgbClr val="F4B183"/>
+                </a:solidFill>
+                <a:latin typeface="Arial Black" panose="020B0A04020102020204" pitchFamily="34" charset="0"/>
+              </a:rPr>
+              <a:t>Menu_Autorezation</a:t>
+            </a:r>
+            <a:br>
+              <a:rPr lang="ru-RU" b="1" dirty="0">
+                <a:solidFill>
+                  <a:schemeClr val="accent5">
+                    <a:lumMod val="60000"/>
+                    <a:lumOff val="40000"/>
+                  </a:schemeClr>
+                </a:solidFill>
+              </a:rPr>
+            </a:br>
+            <a:endParaRPr lang="ru-RU" b="1" dirty="0">
+              <a:solidFill>
+                <a:schemeClr val="accent2">
+                  <a:lumMod val="40000"/>
+                  <a:lumOff val="60000"/>
+                </a:schemeClr>
+              </a:solidFill>
+              <a:effectLst>
+                <a:outerShdw blurRad="38100" dist="38100" dir="2700000" algn="tl">
+                  <a:srgbClr val="000000">
+                    <a:alpha val="43137"/>
+                  </a:srgbClr>
+                </a:outerShdw>
+              </a:effectLst>
+              <a:latin typeface="Arial Black" panose="020B0A04020102020204" pitchFamily="34" charset="0"/>
+            </a:endParaRPr>
+          </a:p>
+        </p:txBody>
+      </p:sp>
+      <p:sp>
+        <p:nvSpPr>
+          <p:cNvPr id="4" name="Объект 3">
+            <a:extLst>
+              <a:ext uri="{FF2B5EF4-FFF2-40B4-BE49-F238E27FC236}">
+                <a16:creationId xmlns:a16="http://schemas.microsoft.com/office/drawing/2014/main" id="{CC7C8AB4-EB42-D87D-0077-13604B8414C7}"/>
+              </a:ext>
+            </a:extLst>
+          </p:cNvPr>
+          <p:cNvSpPr>
+            <a:spLocks noGrp="1"/>
+          </p:cNvSpPr>
+          <p:nvPr>
+            <p:ph idx="1"/>
+          </p:nvPr>
+        </p:nvSpPr>
+        <p:spPr/>
+        <p:txBody>
+          <a:bodyPr/>
+          <a:lstStyle/>
+          <a:p>
+            <a:endParaRPr lang="ru-RU"/>
+          </a:p>
+        </p:txBody>
+      </p:sp>
+      <p:pic>
+        <p:nvPicPr>
+          <p:cNvPr id="6" name="Рисунок 5">
+            <a:extLst>
+              <a:ext uri="{FF2B5EF4-FFF2-40B4-BE49-F238E27FC236}">
+                <a16:creationId xmlns:a16="http://schemas.microsoft.com/office/drawing/2014/main" id="{2A940354-9049-BAEA-5F93-92806410372B}"/>
+              </a:ext>
+            </a:extLst>
+          </p:cNvPr>
+          <p:cNvPicPr>
+            <a:picLocks noChangeAspect="1"/>
+          </p:cNvPicPr>
+          <p:nvPr/>
+        </p:nvPicPr>
+        <p:blipFill>
+          <a:blip r:embed="rId3"/>
+          <a:stretch>
+            <a:fillRect/>
+          </a:stretch>
+        </p:blipFill>
+        <p:spPr>
+          <a:xfrm>
+            <a:off x="226658" y="2743994"/>
+            <a:ext cx="5526072" cy="2514600"/>
+          </a:xfrm>
+          <a:prstGeom prst="roundRect">
+            <a:avLst>
+              <a:gd name="adj" fmla="val 8594"/>
+            </a:avLst>
+          </a:prstGeom>
+          <a:solidFill>
+            <a:srgbClr val="FFFFFF">
+              <a:shade val="85000"/>
+            </a:srgbClr>
+          </a:solidFill>
+          <a:ln>
+            <a:noFill/>
+          </a:ln>
+          <a:effectLst>
+            <a:reflection blurRad="12700" stA="38000" endPos="28000" dist="5000" dir="5400000" sy="-100000" algn="bl" rotWithShape="0"/>
+          </a:effectLst>
+        </p:spPr>
+      </p:pic>
+      <p:pic>
+        <p:nvPicPr>
+          <p:cNvPr id="9" name="Рисунок 8">
+            <a:extLst>
+              <a:ext uri="{FF2B5EF4-FFF2-40B4-BE49-F238E27FC236}">
+                <a16:creationId xmlns:a16="http://schemas.microsoft.com/office/drawing/2014/main" id="{5BBE3C04-CCC5-23BA-E3BC-76EDAB8B5900}"/>
+              </a:ext>
+            </a:extLst>
+          </p:cNvPr>
+          <p:cNvPicPr>
+            <a:picLocks noChangeAspect="1"/>
+          </p:cNvPicPr>
+          <p:nvPr/>
+        </p:nvPicPr>
+        <p:blipFill>
+          <a:blip r:embed="rId4"/>
+          <a:stretch>
+            <a:fillRect/>
+          </a:stretch>
+        </p:blipFill>
+        <p:spPr>
+          <a:xfrm>
+            <a:off x="5941099" y="1754450"/>
+            <a:ext cx="5823257" cy="4657511"/>
+          </a:xfrm>
+          <a:prstGeom prst="roundRect">
+            <a:avLst>
+              <a:gd name="adj" fmla="val 8594"/>
+            </a:avLst>
+          </a:prstGeom>
+          <a:solidFill>
+            <a:srgbClr val="FFFFFF">
+              <a:shade val="85000"/>
+            </a:srgbClr>
+          </a:solidFill>
+          <a:ln>
+            <a:noFill/>
+          </a:ln>
+          <a:effectLst>
+            <a:reflection blurRad="12700" stA="38000" endPos="28000" dist="5000" dir="5400000" sy="-100000" algn="bl" rotWithShape="0"/>
+          </a:effectLst>
+        </p:spPr>
+      </p:pic>
+    </p:spTree>
+    <p:extLst>
+      <p:ext uri="{BB962C8B-B14F-4D97-AF65-F5344CB8AC3E}">
+        <p14:creationId xmlns:p14="http://schemas.microsoft.com/office/powerpoint/2010/main" val="3767592552"/>
+      </p:ext>
+    </p:extLst>
+  </p:cSld>
+  <p:clrMapOvr>
+    <a:masterClrMapping/>
+  </p:clrMapOvr>
+  <mc:AlternateContent xmlns:mc="http://schemas.openxmlformats.org/markup-compatibility/2006">
+    <mc:Choice xmlns:p14="http://schemas.microsoft.com/office/powerpoint/2010/main" Requires="p14">
+      <p:transition spd="slow" p14:dur="1600">
+        <p14:prism isContent="1" isInverted="1"/>
+      </p:transition>
+    </mc:Choice>
+    <mc:Fallback>
+      <p:transition spd="slow">
+        <p:fade/>
+      </p:transition>
+    </mc:Fallback>
+  </mc:AlternateContent>
+</p:sld>
+</file>
+
+<file path=ppt/slides/slide12.xml><?xml version="1.0" encoding="utf-8"?>
+<p:sld xmlns:a="http://schemas.openxmlformats.org/drawingml/2006/main" xmlns:r="http://schemas.openxmlformats.org/officeDocument/2006/relationships" xmlns:p="http://schemas.openxmlformats.org/presentationml/2006/main">
+  <p:cSld>
+    <p:bg>
+      <p:bgPr>
+        <a:blipFill dpi="0" rotWithShape="1">
+          <a:blip r:embed="rId2">
+            <a:lum/>
+          </a:blip>
+          <a:srcRect/>
+          <a:stretch>
+            <a:fillRect/>
+          </a:stretch>
+        </a:blipFill>
+        <a:effectLst/>
+      </p:bgPr>
+    </p:bg>
+    <p:spTree>
+      <p:nvGrpSpPr>
+        <p:cNvPr id="1" name=""/>
+        <p:cNvGrpSpPr/>
+        <p:nvPr/>
+      </p:nvGrpSpPr>
+      <p:grpSpPr>
+        <a:xfrm>
+          <a:off x="0" y="0"/>
+          <a:ext cx="0" cy="0"/>
+          <a:chOff x="0" y="0"/>
+          <a:chExt cx="0" cy="0"/>
+        </a:xfrm>
+      </p:grpSpPr>
+      <p:sp>
+        <p:nvSpPr>
+          <p:cNvPr id="2" name="Заголовок 1">
+            <a:extLst>
+              <a:ext uri="{FF2B5EF4-FFF2-40B4-BE49-F238E27FC236}">
+                <a16:creationId xmlns:a16="http://schemas.microsoft.com/office/drawing/2014/main" id="{DE3C806D-68AC-EE45-5042-9412C778341B}"/>
+              </a:ext>
+            </a:extLst>
+          </p:cNvPr>
+          <p:cNvSpPr>
+            <a:spLocks noGrp="1"/>
+          </p:cNvSpPr>
+          <p:nvPr>
+            <p:ph type="title"/>
+          </p:nvPr>
+        </p:nvSpPr>
+        <p:spPr>
+          <a:xfrm>
+            <a:off x="467026" y="344145"/>
+            <a:ext cx="10948147" cy="1121135"/>
+          </a:xfrm>
+        </p:spPr>
+        <p:txBody>
+          <a:bodyPr>
+            <a:noAutofit/>
+          </a:bodyPr>
+          <a:lstStyle/>
+          <a:p>
+            <a:pPr algn="ctr"/>
+            <a:br>
+              <a:rPr lang="ru-RU" b="1" dirty="0">
+                <a:solidFill>
+                  <a:schemeClr val="accent5">
+                    <a:lumMod val="60000"/>
+                    <a:lumOff val="40000"/>
+                  </a:schemeClr>
+                </a:solidFill>
+              </a:rPr>
+            </a:br>
+            <a:r>
+              <a:rPr lang="ru-RU" b="1" dirty="0">
+                <a:solidFill>
+                  <a:srgbClr val="F4B183"/>
+                </a:solidFill>
+                <a:latin typeface="Arial Black" panose="020B0A04020102020204" pitchFamily="34" charset="0"/>
+              </a:rPr>
+              <a:t>Объяснение реализации проекта в коде</a:t>
+            </a:r>
+            <a:br>
+              <a:rPr lang="ru-RU" b="1" dirty="0">
+                <a:solidFill>
+                  <a:srgbClr val="F4B183"/>
+                </a:solidFill>
+                <a:latin typeface="Arial Black" panose="020B0A04020102020204" pitchFamily="34" charset="0"/>
+              </a:rPr>
+            </a:br>
+            <a:r>
+              <a:rPr lang="en-US" b="1" dirty="0" err="1">
+                <a:solidFill>
+                  <a:srgbClr val="F4B183"/>
+                </a:solidFill>
+                <a:latin typeface="Arial Black" panose="020B0A04020102020204" pitchFamily="34" charset="0"/>
+              </a:rPr>
+              <a:t>Menu_Autorezation</a:t>
+            </a:r>
+            <a:br>
+              <a:rPr lang="ru-RU" b="1" dirty="0">
+                <a:solidFill>
+                  <a:schemeClr val="accent5">
+                    <a:lumMod val="60000"/>
+                    <a:lumOff val="40000"/>
+                  </a:schemeClr>
+                </a:solidFill>
+              </a:rPr>
+            </a:br>
+            <a:endParaRPr lang="ru-RU" b="1" dirty="0">
+              <a:solidFill>
+                <a:schemeClr val="accent2">
+                  <a:lumMod val="40000"/>
+                  <a:lumOff val="60000"/>
+                </a:schemeClr>
+              </a:solidFill>
+              <a:effectLst>
+                <a:outerShdw blurRad="38100" dist="38100" dir="2700000" algn="tl">
+                  <a:srgbClr val="000000">
+                    <a:alpha val="43137"/>
+                  </a:srgbClr>
+                </a:outerShdw>
+              </a:effectLst>
+              <a:latin typeface="Arial Black" panose="020B0A04020102020204" pitchFamily="34" charset="0"/>
+            </a:endParaRPr>
+          </a:p>
+        </p:txBody>
+      </p:sp>
+      <p:sp>
+        <p:nvSpPr>
+          <p:cNvPr id="4" name="Объект 3">
+            <a:extLst>
+              <a:ext uri="{FF2B5EF4-FFF2-40B4-BE49-F238E27FC236}">
+                <a16:creationId xmlns:a16="http://schemas.microsoft.com/office/drawing/2014/main" id="{4FF829CE-53A2-59D5-6593-1970FE3D9A2C}"/>
+              </a:ext>
+            </a:extLst>
+          </p:cNvPr>
+          <p:cNvSpPr>
+            <a:spLocks noGrp="1"/>
+          </p:cNvSpPr>
+          <p:nvPr>
+            <p:ph idx="1"/>
+          </p:nvPr>
+        </p:nvSpPr>
+        <p:spPr/>
+        <p:txBody>
+          <a:bodyPr/>
+          <a:lstStyle/>
+          <a:p>
+            <a:endParaRPr lang="ru-RU" dirty="0"/>
+          </a:p>
+        </p:txBody>
+      </p:sp>
+      <p:pic>
+        <p:nvPicPr>
+          <p:cNvPr id="6" name="Рисунок 5">
+            <a:extLst>
+              <a:ext uri="{FF2B5EF4-FFF2-40B4-BE49-F238E27FC236}">
+                <a16:creationId xmlns:a16="http://schemas.microsoft.com/office/drawing/2014/main" id="{5255A556-7B25-3399-5F84-D40964F6C6B9}"/>
+              </a:ext>
+            </a:extLst>
+          </p:cNvPr>
+          <p:cNvPicPr>
+            <a:picLocks noChangeAspect="1"/>
+          </p:cNvPicPr>
+          <p:nvPr/>
+        </p:nvPicPr>
+        <p:blipFill>
+          <a:blip r:embed="rId3"/>
+          <a:stretch>
+            <a:fillRect/>
+          </a:stretch>
+        </p:blipFill>
+        <p:spPr>
+          <a:xfrm>
+            <a:off x="355107" y="1825625"/>
+            <a:ext cx="4723283" cy="4882719"/>
+          </a:xfrm>
+          <a:prstGeom prst="roundRect">
+            <a:avLst>
+              <a:gd name="adj" fmla="val 8594"/>
+            </a:avLst>
+          </a:prstGeom>
+          <a:solidFill>
+            <a:srgbClr val="FFFFFF">
+              <a:shade val="85000"/>
+            </a:srgbClr>
+          </a:solidFill>
+          <a:ln>
+            <a:noFill/>
+          </a:ln>
+          <a:effectLst>
+            <a:reflection blurRad="12700" stA="38000" endPos="28000" dist="5000" dir="5400000" sy="-100000" algn="bl" rotWithShape="0"/>
+          </a:effectLst>
+        </p:spPr>
+      </p:pic>
+      <p:pic>
+        <p:nvPicPr>
+          <p:cNvPr id="9" name="Рисунок 8">
+            <a:extLst>
+              <a:ext uri="{FF2B5EF4-FFF2-40B4-BE49-F238E27FC236}">
+                <a16:creationId xmlns:a16="http://schemas.microsoft.com/office/drawing/2014/main" id="{4181EED6-326F-8C8B-177C-8F433C530B4D}"/>
+              </a:ext>
+            </a:extLst>
+          </p:cNvPr>
+          <p:cNvPicPr>
+            <a:picLocks noChangeAspect="1"/>
+          </p:cNvPicPr>
+          <p:nvPr/>
+        </p:nvPicPr>
+        <p:blipFill>
+          <a:blip r:embed="rId4"/>
+          <a:stretch>
+            <a:fillRect/>
+          </a:stretch>
+        </p:blipFill>
+        <p:spPr>
+          <a:xfrm>
+            <a:off x="6837744" y="1825625"/>
+            <a:ext cx="4308588" cy="4810607"/>
+          </a:xfrm>
+          <a:prstGeom prst="roundRect">
+            <a:avLst>
+              <a:gd name="adj" fmla="val 8594"/>
+            </a:avLst>
+          </a:prstGeom>
+          <a:solidFill>
+            <a:srgbClr val="FFFFFF">
+              <a:shade val="85000"/>
+            </a:srgbClr>
+          </a:solidFill>
+          <a:ln>
+            <a:noFill/>
+          </a:ln>
+          <a:effectLst>
+            <a:reflection blurRad="12700" stA="38000" endPos="28000" dist="5000" dir="5400000" sy="-100000" algn="bl" rotWithShape="0"/>
+          </a:effectLst>
+        </p:spPr>
+      </p:pic>
+    </p:spTree>
+    <p:extLst>
+      <p:ext uri="{BB962C8B-B14F-4D97-AF65-F5344CB8AC3E}">
+        <p14:creationId xmlns:p14="http://schemas.microsoft.com/office/powerpoint/2010/main" val="3875434287"/>
+      </p:ext>
+    </p:extLst>
+  </p:cSld>
+  <p:clrMapOvr>
+    <a:masterClrMapping/>
+  </p:clrMapOvr>
+  <mc:AlternateContent xmlns:mc="http://schemas.openxmlformats.org/markup-compatibility/2006">
+    <mc:Choice xmlns:p14="http://schemas.microsoft.com/office/powerpoint/2010/main" Requires="p14">
+      <p:transition spd="slow" p14:dur="1600">
+        <p14:prism isContent="1" isInverted="1"/>
+      </p:transition>
+    </mc:Choice>
+    <mc:Fallback>
+      <p:transition spd="slow">
+        <p:fade/>
+      </p:transition>
+    </mc:Fallback>
+  </mc:AlternateContent>
+</p:sld>
+</file>
+
+<file path=ppt/slides/slide13.xml><?xml version="1.0" encoding="utf-8"?>
+<p:sld xmlns:a="http://schemas.openxmlformats.org/drawingml/2006/main" xmlns:r="http://schemas.openxmlformats.org/officeDocument/2006/relationships" xmlns:p="http://schemas.openxmlformats.org/presentationml/2006/main">
+  <p:cSld>
+    <p:bg>
+      <p:bgPr>
+        <a:blipFill dpi="0" rotWithShape="1">
+          <a:blip r:embed="rId2">
+            <a:lum/>
+          </a:blip>
+          <a:srcRect/>
+          <a:stretch>
+            <a:fillRect/>
+          </a:stretch>
+        </a:blipFill>
+        <a:effectLst/>
+      </p:bgPr>
+    </p:bg>
+    <p:spTree>
+      <p:nvGrpSpPr>
+        <p:cNvPr id="1" name=""/>
+        <p:cNvGrpSpPr/>
+        <p:nvPr/>
+      </p:nvGrpSpPr>
+      <p:grpSpPr>
+        <a:xfrm>
+          <a:off x="0" y="0"/>
+          <a:ext cx="0" cy="0"/>
+          <a:chOff x="0" y="0"/>
+          <a:chExt cx="0" cy="0"/>
+        </a:xfrm>
+      </p:grpSpPr>
+      <p:sp>
+        <p:nvSpPr>
+          <p:cNvPr id="2" name="Заголовок 1">
+            <a:extLst>
+              <a:ext uri="{FF2B5EF4-FFF2-40B4-BE49-F238E27FC236}">
+                <a16:creationId xmlns:a16="http://schemas.microsoft.com/office/drawing/2014/main" id="{DE3C806D-68AC-EE45-5042-9412C778341B}"/>
+              </a:ext>
+            </a:extLst>
+          </p:cNvPr>
+          <p:cNvSpPr>
+            <a:spLocks noGrp="1"/>
+          </p:cNvSpPr>
+          <p:nvPr>
+            <p:ph type="title"/>
+          </p:nvPr>
+        </p:nvSpPr>
+        <p:spPr>
+          <a:xfrm>
+            <a:off x="520147" y="270343"/>
+            <a:ext cx="10948147" cy="1121135"/>
+          </a:xfrm>
+        </p:spPr>
+        <p:txBody>
+          <a:bodyPr>
+            <a:noAutofit/>
+          </a:bodyPr>
+          <a:lstStyle/>
+          <a:p>
+            <a:pPr algn="ctr"/>
+            <a:r>
+              <a:rPr lang="ru-RU" sz="4800" b="1" dirty="0">
+                <a:solidFill>
+                  <a:srgbClr val="F4B183"/>
+                </a:solidFill>
+                <a:effectLst>
+                  <a:outerShdw blurRad="38100" dist="38100" dir="2700000" algn="tl">
+                    <a:srgbClr val="000000">
+                      <a:alpha val="43137"/>
+                    </a:srgbClr>
+                  </a:outerShdw>
+                </a:effectLst>
+                <a:latin typeface="Arial Black" panose="020B0A04020102020204" pitchFamily="34" charset="0"/>
+              </a:rPr>
+              <a:t>Заключение</a:t>
+            </a:r>
+          </a:p>
+        </p:txBody>
+      </p:sp>
+      <p:sp>
+        <p:nvSpPr>
+          <p:cNvPr id="4" name="Объект 3">
+            <a:extLst>
+              <a:ext uri="{FF2B5EF4-FFF2-40B4-BE49-F238E27FC236}">
+                <a16:creationId xmlns:a16="http://schemas.microsoft.com/office/drawing/2014/main" id="{369DC6B1-F77B-6C08-3543-89B96F25F6D5}"/>
+              </a:ext>
+            </a:extLst>
+          </p:cNvPr>
+          <p:cNvSpPr>
+            <a:spLocks noGrp="1"/>
+          </p:cNvSpPr>
+          <p:nvPr>
+            <p:ph idx="1"/>
+          </p:nvPr>
+        </p:nvSpPr>
+        <p:spPr>
+          <a:xfrm>
+            <a:off x="400878" y="1622869"/>
+            <a:ext cx="10515600" cy="4964788"/>
+          </a:xfrm>
+        </p:spPr>
+        <p:txBody>
+          <a:bodyPr>
+            <a:normAutofit/>
+          </a:bodyPr>
+          <a:lstStyle/>
+          <a:p>
+            <a:pPr marL="0" indent="0" algn="just">
+              <a:buNone/>
+            </a:pPr>
+            <a:r>
+              <a:rPr lang="ru-RU" b="1" dirty="0">
+                <a:solidFill>
+                  <a:srgbClr val="E69348"/>
+                </a:solidFill>
+              </a:rPr>
+              <a:t>Реализация проекта мне очень понравилась. Был счастлив, что снова вернулся к шифрованию файлов и ключам </a:t>
+            </a:r>
+            <a:r>
+              <a:rPr lang="en-US" b="1" dirty="0">
+                <a:solidFill>
+                  <a:srgbClr val="E69348"/>
+                </a:solidFill>
+              </a:rPr>
+              <a:t>API</a:t>
+            </a:r>
+            <a:r>
+              <a:rPr lang="ru-RU" b="1" dirty="0">
+                <a:solidFill>
+                  <a:srgbClr val="E69348"/>
+                </a:solidFill>
+              </a:rPr>
+              <a:t> которые создавали в прошлом для меня большую историю. Я создаю ключи в 50 символов, но если посмотреть в кодировку 1 биткоин, то он состоит из 32 символов (Биткоин – дорогая цифровая валюта)</a:t>
+            </a:r>
+          </a:p>
+          <a:p>
+            <a:pPr marL="0" indent="0" algn="just">
+              <a:buNone/>
+            </a:pPr>
+            <a:r>
+              <a:rPr lang="ru-RU" b="1" dirty="0">
+                <a:solidFill>
+                  <a:srgbClr val="B96519"/>
+                </a:solidFill>
+              </a:rPr>
+              <a:t>Возможности развития моего проекта является создание хостинга с большой Базой Данных в котором будут сохраняться | записываться файлы или данные загруженным пользователем в мою программу. Так можно будет легко отследить пользователя, изменив кодировку и размер файла ключа в код. Код уже будет взаимодействовать от хостинга. </a:t>
+            </a:r>
+          </a:p>
+        </p:txBody>
+      </p:sp>
+    </p:spTree>
+    <p:extLst>
+      <p:ext uri="{BB962C8B-B14F-4D97-AF65-F5344CB8AC3E}">
+        <p14:creationId xmlns:p14="http://schemas.microsoft.com/office/powerpoint/2010/main" val="2365465500"/>
+      </p:ext>
+    </p:extLst>
+  </p:cSld>
+  <p:clrMapOvr>
+    <a:masterClrMapping/>
+  </p:clrMapOvr>
+  <mc:AlternateContent xmlns:mc="http://schemas.openxmlformats.org/markup-compatibility/2006" xmlns:p14="http://schemas.microsoft.com/office/powerpoint/2010/main">
+    <mc:Choice Requires="p14">
+      <p:transition spd="slow" p14:dur="1600">
+        <p14:prism isContent="1" isInverted="1"/>
+      </p:transition>
+    </mc:Choice>
+    <mc:Fallback xmlns="">
+      <p:transition spd="slow">
+        <p:fade/>
+      </p:transition>
+    </mc:Fallback>
+  </mc:AlternateContent>
+</p:sld>
+</file>
+
+<file path=ppt/slides/slide14.xml><?xml version="1.0" encoding="utf-8"?>
+<p:sld xmlns:a="http://schemas.openxmlformats.org/drawingml/2006/main" xmlns:r="http://schemas.openxmlformats.org/officeDocument/2006/relationships" xmlns:p="http://schemas.openxmlformats.org/presentationml/2006/main">
+  <p:cSld>
+    <p:bg>
+      <p:bgPr>
+        <a:blipFill dpi="0" rotWithShape="1">
+          <a:blip r:embed="rId2">
+            <a:lum/>
+          </a:blip>
+          <a:srcRect/>
+          <a:stretch>
+            <a:fillRect/>
+          </a:stretch>
+        </a:blipFill>
+        <a:effectLst/>
+      </p:bgPr>
+    </p:bg>
+    <p:spTree>
+      <p:nvGrpSpPr>
+        <p:cNvPr id="1" name=""/>
+        <p:cNvGrpSpPr/>
+        <p:nvPr/>
+      </p:nvGrpSpPr>
+      <p:grpSpPr>
+        <a:xfrm>
+          <a:off x="0" y="0"/>
+          <a:ext cx="0" cy="0"/>
+          <a:chOff x="0" y="0"/>
+          <a:chExt cx="0" cy="0"/>
+        </a:xfrm>
+      </p:grpSpPr>
+      <p:sp>
+        <p:nvSpPr>
+          <p:cNvPr id="2" name="Заголовок 1">
+            <a:extLst>
+              <a:ext uri="{FF2B5EF4-FFF2-40B4-BE49-F238E27FC236}">
+                <a16:creationId xmlns:a16="http://schemas.microsoft.com/office/drawing/2014/main" id="{DE3C806D-68AC-EE45-5042-9412C778341B}"/>
+              </a:ext>
+            </a:extLst>
+          </p:cNvPr>
+          <p:cNvSpPr>
+            <a:spLocks noGrp="1"/>
+          </p:cNvSpPr>
+          <p:nvPr>
+            <p:ph type="title"/>
+          </p:nvPr>
+        </p:nvSpPr>
+        <p:spPr>
+          <a:xfrm>
+            <a:off x="520147" y="270343"/>
+            <a:ext cx="10948147" cy="1121135"/>
+          </a:xfrm>
+        </p:spPr>
+        <p:txBody>
+          <a:bodyPr>
+            <a:noAutofit/>
+          </a:bodyPr>
+          <a:lstStyle/>
+          <a:p>
+            <a:pPr algn="ctr"/>
+            <a:r>
+              <a:rPr lang="ru-RU" sz="4800" b="1" dirty="0">
+                <a:solidFill>
+                  <a:srgbClr val="F4B183"/>
+                </a:solidFill>
+                <a:effectLst>
+                  <a:outerShdw blurRad="38100" dist="38100" dir="2700000" algn="tl">
+                    <a:srgbClr val="000000">
+                      <a:alpha val="43137"/>
+                    </a:srgbClr>
+                  </a:outerShdw>
+                </a:effectLst>
+                <a:latin typeface="Arial Black" panose="020B0A04020102020204" pitchFamily="34" charset="0"/>
+              </a:rPr>
+              <a:t>Заключение</a:t>
+            </a:r>
+          </a:p>
+        </p:txBody>
+      </p:sp>
+      <p:sp>
+        <p:nvSpPr>
+          <p:cNvPr id="4" name="Объект 3">
+            <a:extLst>
+              <a:ext uri="{FF2B5EF4-FFF2-40B4-BE49-F238E27FC236}">
+                <a16:creationId xmlns:a16="http://schemas.microsoft.com/office/drawing/2014/main" id="{369DC6B1-F77B-6C08-3543-89B96F25F6D5}"/>
+              </a:ext>
+            </a:extLst>
+          </p:cNvPr>
+          <p:cNvSpPr>
+            <a:spLocks noGrp="1"/>
+          </p:cNvSpPr>
+          <p:nvPr>
+            <p:ph idx="1"/>
+          </p:nvPr>
+        </p:nvSpPr>
+        <p:spPr>
+          <a:xfrm>
+            <a:off x="400878" y="1622869"/>
+            <a:ext cx="10515600" cy="4964788"/>
+          </a:xfrm>
+        </p:spPr>
+        <p:txBody>
+          <a:bodyPr>
+            <a:normAutofit/>
+          </a:bodyPr>
+          <a:lstStyle/>
+          <a:p>
+            <a:pPr marL="0" indent="0" algn="just">
+              <a:buNone/>
+            </a:pPr>
+            <a:r>
+              <a:rPr lang="ru-RU" b="1" dirty="0">
+                <a:solidFill>
+                  <a:srgbClr val="E69348"/>
+                </a:solidFill>
+              </a:rPr>
+              <a:t>Так же, в будущем я планирую файл Авторизации подсоединить к своему основному файлу – </a:t>
+            </a:r>
+            <a:r>
+              <a:rPr lang="en-US" b="1" dirty="0">
+                <a:solidFill>
+                  <a:srgbClr val="E69348"/>
+                </a:solidFill>
+              </a:rPr>
+              <a:t>Decrypt And Encrypt </a:t>
+            </a:r>
+            <a:r>
+              <a:rPr lang="ru-RU" b="1" dirty="0">
+                <a:solidFill>
+                  <a:srgbClr val="E69348"/>
+                </a:solidFill>
+              </a:rPr>
+              <a:t>и всё сделать воплощение к подсоединению веб-сайта.</a:t>
+            </a:r>
+          </a:p>
+          <a:p>
+            <a:pPr marL="0" indent="0" algn="just">
+              <a:buNone/>
+            </a:pPr>
+            <a:endParaRPr lang="ru-RU" b="1" dirty="0">
+              <a:solidFill>
+                <a:srgbClr val="E69348"/>
+              </a:solidFill>
+            </a:endParaRPr>
+          </a:p>
+          <a:p>
+            <a:pPr marL="0" indent="0" algn="just">
+              <a:buNone/>
+            </a:pPr>
+            <a:endParaRPr lang="ru-RU" b="1" dirty="0">
+              <a:solidFill>
+                <a:srgbClr val="E69348"/>
+              </a:solidFill>
+            </a:endParaRPr>
+          </a:p>
+          <a:p>
+            <a:pPr marL="0" indent="0" algn="just">
+              <a:buNone/>
+            </a:pPr>
+            <a:endParaRPr lang="ru-RU" b="1" dirty="0">
+              <a:solidFill>
+                <a:srgbClr val="E69348"/>
+              </a:solidFill>
+            </a:endParaRPr>
+          </a:p>
+          <a:p>
+            <a:pPr marL="0" indent="0" algn="just">
+              <a:buNone/>
+            </a:pPr>
+            <a:r>
+              <a:rPr lang="ru-RU" b="1" dirty="0">
+                <a:solidFill>
+                  <a:srgbClr val="B96519"/>
+                </a:solidFill>
+              </a:rPr>
+              <a:t>Самое основное, что в этом проекте – это можно заметить сравнение базы данных </a:t>
+            </a:r>
+            <a:r>
+              <a:rPr lang="en-US" b="1" dirty="0">
+                <a:solidFill>
+                  <a:srgbClr val="B96519"/>
+                </a:solidFill>
+              </a:rPr>
+              <a:t>SQL </a:t>
+            </a:r>
+            <a:r>
+              <a:rPr lang="ru-RU" b="1" dirty="0">
+                <a:solidFill>
+                  <a:srgbClr val="B96519"/>
+                </a:solidFill>
+              </a:rPr>
+              <a:t>и </a:t>
+            </a:r>
+            <a:r>
+              <a:rPr lang="en-US" b="1" dirty="0">
+                <a:solidFill>
+                  <a:srgbClr val="B96519"/>
+                </a:solidFill>
+              </a:rPr>
+              <a:t>MySQL (MariaDB)</a:t>
+            </a:r>
+            <a:r>
+              <a:rPr lang="ru-RU" b="1" dirty="0">
+                <a:solidFill>
+                  <a:srgbClr val="B96519"/>
+                </a:solidFill>
+              </a:rPr>
+              <a:t>. То, что </a:t>
+            </a:r>
+            <a:r>
+              <a:rPr lang="en-US" b="1" dirty="0">
+                <a:solidFill>
+                  <a:srgbClr val="B96519"/>
+                </a:solidFill>
+              </a:rPr>
+              <a:t>SQL </a:t>
+            </a:r>
+            <a:r>
+              <a:rPr lang="ru-RU" b="1" dirty="0">
+                <a:solidFill>
+                  <a:srgbClr val="B96519"/>
+                </a:solidFill>
+              </a:rPr>
+              <a:t>подходит для удобной работы, а </a:t>
+            </a:r>
+            <a:r>
+              <a:rPr lang="en-US" b="1" dirty="0">
+                <a:solidFill>
+                  <a:srgbClr val="B96519"/>
+                </a:solidFill>
+              </a:rPr>
+              <a:t>MySQL </a:t>
+            </a:r>
+            <a:r>
+              <a:rPr lang="ru-RU" b="1" dirty="0">
+                <a:solidFill>
+                  <a:srgbClr val="B96519"/>
+                </a:solidFill>
+              </a:rPr>
+              <a:t>подходит для продвинутой и углублённой работы с сетями, доменами, портами и прочем.</a:t>
+            </a:r>
+          </a:p>
+        </p:txBody>
+      </p:sp>
+    </p:spTree>
+    <p:extLst>
+      <p:ext uri="{BB962C8B-B14F-4D97-AF65-F5344CB8AC3E}">
+        <p14:creationId xmlns:p14="http://schemas.microsoft.com/office/powerpoint/2010/main" val="1701472156"/>
+      </p:ext>
+    </p:extLst>
+  </p:cSld>
+  <p:clrMapOvr>
+    <a:masterClrMapping/>
+  </p:clrMapOvr>
+  <mc:AlternateContent xmlns:mc="http://schemas.openxmlformats.org/markup-compatibility/2006">
+    <mc:Choice xmlns:p14="http://schemas.microsoft.com/office/powerpoint/2010/main" Requires="p14">
+      <p:transition spd="slow" p14:dur="1600">
+        <p14:prism isContent="1" isInverted="1"/>
+      </p:transition>
+    </mc:Choice>
+    <mc:Fallback>
+      <p:transition spd="slow">
+        <p:fade/>
+      </p:transition>
+    </mc:Fallback>
+  </mc:AlternateContent>
+</p:sld>
+</file>
+
+<file path=ppt/slides/slide15.xml><?xml version="1.0" encoding="utf-8"?>
+<p:sld xmlns:a="http://schemas.openxmlformats.org/drawingml/2006/main" xmlns:r="http://schemas.openxmlformats.org/officeDocument/2006/relationships" xmlns:p="http://schemas.openxmlformats.org/presentationml/2006/main">
+  <p:cSld>
+    <p:bg>
+      <p:bgPr>
+        <a:blipFill dpi="0" rotWithShape="1">
+          <a:blip r:embed="rId2">
+            <a:lum/>
+          </a:blip>
+          <a:srcRect/>
+          <a:stretch>
+            <a:fillRect/>
+          </a:stretch>
+        </a:blipFill>
+        <a:effectLst/>
+      </p:bgPr>
+    </p:bg>
+    <p:spTree>
+      <p:nvGrpSpPr>
+        <p:cNvPr id="1" name=""/>
+        <p:cNvGrpSpPr/>
+        <p:nvPr/>
+      </p:nvGrpSpPr>
+      <p:grpSpPr>
+        <a:xfrm>
+          <a:off x="0" y="0"/>
+          <a:ext cx="0" cy="0"/>
+          <a:chOff x="0" y="0"/>
+          <a:chExt cx="0" cy="0"/>
+        </a:xfrm>
+      </p:grpSpPr>
+      <p:sp>
+        <p:nvSpPr>
+          <p:cNvPr id="2" name="Заголовок 1">
+            <a:extLst>
+              <a:ext uri="{FF2B5EF4-FFF2-40B4-BE49-F238E27FC236}">
+                <a16:creationId xmlns:a16="http://schemas.microsoft.com/office/drawing/2014/main" id="{DE3C806D-68AC-EE45-5042-9412C778341B}"/>
+              </a:ext>
+            </a:extLst>
+          </p:cNvPr>
+          <p:cNvSpPr>
+            <a:spLocks noGrp="1"/>
+          </p:cNvSpPr>
+          <p:nvPr>
+            <p:ph type="title"/>
+          </p:nvPr>
+        </p:nvSpPr>
+        <p:spPr>
+          <a:xfrm>
             <a:off x="7920998" y="0"/>
             <a:ext cx="4271002" cy="5467149"/>
           </a:xfrm>
@@ -4886,13 +6009,13 @@
   <p:clrMapOvr>
     <a:masterClrMapping/>
   </p:clrMapOvr>
-  <mc:AlternateContent xmlns:mc="http://schemas.openxmlformats.org/markup-compatibility/2006">
-    <mc:Choice xmlns:p14="http://schemas.microsoft.com/office/powerpoint/2010/main" Requires="p14">
+  <mc:AlternateContent xmlns:mc="http://schemas.openxmlformats.org/markup-compatibility/2006" xmlns:p14="http://schemas.microsoft.com/office/powerpoint/2010/main">
+    <mc:Choice Requires="p14">
       <p:transition spd="slow" p14:dur="1500">
         <p14:window dir="vert"/>
       </p:transition>
     </mc:Choice>
-    <mc:Fallback>
+    <mc:Fallback xmlns="">
       <p:transition spd="slow">
         <p:fade/>
       </p:transition>
@@ -5205,13 +6328,13 @@
   <p:clrMapOvr>
     <a:masterClrMapping/>
   </p:clrMapOvr>
-  <mc:AlternateContent xmlns:mc="http://schemas.openxmlformats.org/markup-compatibility/2006">
-    <mc:Choice xmlns:p159="http://schemas.microsoft.com/office/powerpoint/2015/09/main" Requires="p159">
+  <mc:AlternateContent xmlns:mc="http://schemas.openxmlformats.org/markup-compatibility/2006" xmlns:p159="http://schemas.microsoft.com/office/powerpoint/2015/09/main">
+    <mc:Choice Requires="p159">
       <p:transition xmlns:p14="http://schemas.microsoft.com/office/powerpoint/2010/main" spd="slow" p14:dur="2000">
         <p159:morph option="byObject"/>
       </p:transition>
     </mc:Choice>
-    <mc:Fallback>
+    <mc:Fallback xmlns="">
       <p:transition spd="slow">
         <p:fade/>
       </p:transition>
@@ -5474,13 +6597,13 @@
   <p:clrMapOvr>
     <a:masterClrMapping/>
   </p:clrMapOvr>
-  <mc:AlternateContent xmlns:mc="http://schemas.openxmlformats.org/markup-compatibility/2006">
-    <mc:Choice xmlns:p14="http://schemas.microsoft.com/office/powerpoint/2010/main" Requires="p14">
+  <mc:AlternateContent xmlns:mc="http://schemas.openxmlformats.org/markup-compatibility/2006" xmlns:p14="http://schemas.microsoft.com/office/powerpoint/2010/main">
+    <mc:Choice Requires="p14">
       <p:transition spd="slow" p14:dur="800">
         <p14:flythrough/>
       </p:transition>
     </mc:Choice>
-    <mc:Fallback>
+    <mc:Fallback xmlns="">
       <p:transition spd="slow">
         <p:fade/>
       </p:transition>
@@ -6971,13 +8094,13 @@
   <p:clrMapOvr>
     <a:masterClrMapping/>
   </p:clrMapOvr>
-  <mc:AlternateContent xmlns:mc="http://schemas.openxmlformats.org/markup-compatibility/2006">
-    <mc:Choice xmlns:p14="http://schemas.microsoft.com/office/powerpoint/2010/main" Requires="p14">
+  <mc:AlternateContent xmlns:mc="http://schemas.openxmlformats.org/markup-compatibility/2006" xmlns:p14="http://schemas.microsoft.com/office/powerpoint/2010/main">
+    <mc:Choice Requires="p14">
       <p:transition spd="slow" p14:dur="800">
         <p14:flythrough/>
       </p:transition>
     </mc:Choice>
-    <mc:Fallback>
+    <mc:Fallback xmlns="">
       <p:transition spd="slow">
         <p:fade/>
       </p:transition>
@@ -7334,13 +8457,13 @@
   <p:clrMapOvr>
     <a:masterClrMapping/>
   </p:clrMapOvr>
-  <mc:AlternateContent xmlns:mc="http://schemas.openxmlformats.org/markup-compatibility/2006">
-    <mc:Choice xmlns:p14="http://schemas.microsoft.com/office/powerpoint/2010/main" Requires="p14">
+  <mc:AlternateContent xmlns:mc="http://schemas.openxmlformats.org/markup-compatibility/2006" xmlns:p14="http://schemas.microsoft.com/office/powerpoint/2010/main">
+    <mc:Choice Requires="p14">
       <p:transition spd="slow" p14:dur="800">
         <p14:flythrough/>
       </p:transition>
     </mc:Choice>
-    <mc:Fallback>
+    <mc:Fallback xmlns="">
       <p:transition spd="slow">
         <p:fade/>
       </p:transition>
@@ -7594,13 +8717,13 @@
   <p:clrMapOvr>
     <a:masterClrMapping/>
   </p:clrMapOvr>
-  <mc:AlternateContent xmlns:mc="http://schemas.openxmlformats.org/markup-compatibility/2006">
-    <mc:Choice xmlns:p14="http://schemas.microsoft.com/office/powerpoint/2010/main" Requires="p14">
+  <mc:AlternateContent xmlns:mc="http://schemas.openxmlformats.org/markup-compatibility/2006" xmlns:p14="http://schemas.microsoft.com/office/powerpoint/2010/main">
+    <mc:Choice Requires="p14">
       <p:transition spd="slow" p14:dur="1600">
         <p14:prism isContent="1" isInverted="1"/>
       </p:transition>
     </mc:Choice>
-    <mc:Fallback>
+    <mc:Fallback xmlns="">
       <p:transition spd="slow">
         <p:fade/>
       </p:transition>
@@ -7664,13 +8787,13 @@
         </p:spPr>
         <p:txBody>
           <a:bodyPr>
-            <a:normAutofit fontScale="90000"/>
+            <a:noAutofit/>
           </a:bodyPr>
           <a:lstStyle/>
           <a:p>
             <a:pPr algn="ctr"/>
             <a:br>
-              <a:rPr lang="ru-RU" sz="6600" b="1" dirty="0">
+              <a:rPr lang="ru-RU" b="1" dirty="0">
                 <a:solidFill>
                   <a:schemeClr val="accent5">
                     <a:lumMod val="60000"/>
@@ -7680,7 +8803,7 @@
               </a:rPr>
             </a:br>
             <a:r>
-              <a:rPr lang="ru-RU" sz="5300" b="1" dirty="0">
+              <a:rPr lang="ru-RU" b="1" dirty="0">
                 <a:solidFill>
                   <a:srgbClr val="F4B183"/>
                 </a:solidFill>
@@ -7689,7 +8812,24 @@
               <a:t>Объяснение реализации проекта в коде</a:t>
             </a:r>
             <a:br>
-              <a:rPr lang="ru-RU" sz="6600" b="1" dirty="0">
+              <a:rPr lang="ru-RU" b="1" dirty="0">
+                <a:solidFill>
+                  <a:srgbClr val="F4B183"/>
+                </a:solidFill>
+                <a:latin typeface="Arial Black" panose="020B0A04020102020204" pitchFamily="34" charset="0"/>
+              </a:rPr>
+            </a:br>
+            <a:r>
+              <a:rPr lang="en-US" b="1" dirty="0" err="1">
+                <a:solidFill>
+                  <a:srgbClr val="F4B183"/>
+                </a:solidFill>
+                <a:latin typeface="Arial Black" panose="020B0A04020102020204" pitchFamily="34" charset="0"/>
+              </a:rPr>
+              <a:t>Descrypt_and_Encrypt</a:t>
+            </a:r>
+            <a:br>
+              <a:rPr lang="ru-RU" b="1" dirty="0">
                 <a:solidFill>
                   <a:schemeClr val="accent5">
                     <a:lumMod val="60000"/>
@@ -7698,7 +8838,7 @@
                 </a:solidFill>
               </a:rPr>
             </a:br>
-            <a:endParaRPr lang="ru-RU" sz="6600" b="1" dirty="0">
+            <a:endParaRPr lang="ru-RU" b="1" dirty="0">
               <a:solidFill>
                 <a:schemeClr val="accent2">
                   <a:lumMod val="40000"/>
@@ -8029,13 +9169,13 @@
   <p:clrMapOvr>
     <a:masterClrMapping/>
   </p:clrMapOvr>
-  <mc:AlternateContent xmlns:mc="http://schemas.openxmlformats.org/markup-compatibility/2006">
-    <mc:Choice xmlns:p14="http://schemas.microsoft.com/office/powerpoint/2010/main" Requires="p14">
+  <mc:AlternateContent xmlns:mc="http://schemas.openxmlformats.org/markup-compatibility/2006" xmlns:p14="http://schemas.microsoft.com/office/powerpoint/2010/main">
+    <mc:Choice Requires="p14">
       <p:transition spd="slow" p14:dur="1600">
         <p14:prism isContent="1" isInverted="1"/>
       </p:transition>
     </mc:Choice>
-    <mc:Fallback>
+    <mc:Fallback xmlns="">
       <p:transition spd="slow">
         <p:fade/>
       </p:transition>
@@ -8093,8 +9233,8 @@
         </p:nvSpPr>
         <p:spPr>
           <a:xfrm>
-            <a:off x="470877" y="254441"/>
-            <a:ext cx="10948147" cy="1121135"/>
+            <a:off x="1070817" y="369284"/>
+            <a:ext cx="10248432" cy="1061951"/>
           </a:xfrm>
         </p:spPr>
         <p:txBody>
@@ -8104,8 +9244,18 @@
           <a:lstStyle/>
           <a:p>
             <a:pPr algn="ctr"/>
-            <a:r>
-              <a:rPr lang="ru-RU" sz="4800" b="1" dirty="0">
+            <a:br>
+              <a:rPr lang="ru-RU" b="1" dirty="0">
+                <a:solidFill>
+                  <a:schemeClr val="accent5">
+                    <a:lumMod val="60000"/>
+                    <a:lumOff val="40000"/>
+                  </a:schemeClr>
+                </a:solidFill>
+              </a:rPr>
+            </a:br>
+            <a:r>
+              <a:rPr lang="ru-RU" b="1" dirty="0">
                 <a:solidFill>
                   <a:srgbClr val="F4B183"/>
                 </a:solidFill>
@@ -8113,7 +9263,34 @@
               </a:rPr>
               <a:t>Объяснение реализации проекта в коде</a:t>
             </a:r>
-            <a:endParaRPr lang="ru-RU" sz="4800" b="1" dirty="0">
+            <a:br>
+              <a:rPr lang="ru-RU" b="1" dirty="0">
+                <a:solidFill>
+                  <a:srgbClr val="F4B183"/>
+                </a:solidFill>
+                <a:latin typeface="Arial Black" panose="020B0A04020102020204" pitchFamily="34" charset="0"/>
+              </a:rPr>
+            </a:br>
+            <a:r>
+              <a:rPr lang="en-US" b="1" dirty="0" err="1">
+                <a:solidFill>
+                  <a:srgbClr val="F4B183"/>
+                </a:solidFill>
+                <a:latin typeface="Arial Black" panose="020B0A04020102020204" pitchFamily="34" charset="0"/>
+              </a:rPr>
+              <a:t>Menu_Autorezation</a:t>
+            </a:r>
+            <a:br>
+              <a:rPr lang="ru-RU" b="1" dirty="0">
+                <a:solidFill>
+                  <a:schemeClr val="accent5">
+                    <a:lumMod val="60000"/>
+                    <a:lumOff val="40000"/>
+                  </a:schemeClr>
+                </a:solidFill>
+              </a:rPr>
+            </a:br>
+            <a:endParaRPr lang="ru-RU" b="1" dirty="0">
               <a:solidFill>
                 <a:schemeClr val="accent2">
                   <a:lumMod val="40000"/>
@@ -8134,10 +9311,10 @@
       </p:sp>
       <p:sp>
         <p:nvSpPr>
-          <p:cNvPr id="3" name="Объект 2">
-            <a:extLst>
-              <a:ext uri="{FF2B5EF4-FFF2-40B4-BE49-F238E27FC236}">
-                <a16:creationId xmlns:a16="http://schemas.microsoft.com/office/drawing/2014/main" id="{5C13B368-D937-BC3A-5BE3-E284717B6839}"/>
+          <p:cNvPr id="26" name="Объект 25">
+            <a:extLst>
+              <a:ext uri="{FF2B5EF4-FFF2-40B4-BE49-F238E27FC236}">
+                <a16:creationId xmlns:a16="http://schemas.microsoft.com/office/drawing/2014/main" id="{F6177B41-8950-5BB0-4374-98A1C3D397DE}"/>
               </a:ext>
             </a:extLst>
           </p:cNvPr>
@@ -8150,9 +9327,10 @@
         </p:nvSpPr>
         <p:spPr>
           <a:xfrm>
-            <a:off x="470877" y="2411779"/>
-            <a:ext cx="10515600" cy="4351338"/>
+            <a:off x="525585" y="1828799"/>
+            <a:ext cx="10582523" cy="4364066"/>
           </a:xfrm>
+          <a:noFill/>
         </p:spPr>
         <p:txBody>
           <a:bodyPr>
@@ -8160,138 +9338,170 @@
           </a:bodyPr>
           <a:lstStyle/>
           <a:p>
-            <a:endParaRPr lang="ru-RU" sz="3200" b="1" dirty="0">
-              <a:solidFill>
-                <a:srgbClr val="DD5FC3"/>
-              </a:solidFill>
-            </a:endParaRPr>
-          </a:p>
-        </p:txBody>
-      </p:sp>
-      <p:pic>
-        <p:nvPicPr>
-          <p:cNvPr id="6" name="Объект 6">
-            <a:extLst>
-              <a:ext uri="{FF2B5EF4-FFF2-40B4-BE49-F238E27FC236}">
-                <a16:creationId xmlns:a16="http://schemas.microsoft.com/office/drawing/2014/main" id="{C3F07C1C-0F3E-7329-0D3B-C3145BF52061}"/>
-              </a:ext>
-            </a:extLst>
-          </p:cNvPr>
-          <p:cNvPicPr>
-            <a:picLocks noChangeAspect="1"/>
-          </p:cNvPicPr>
-          <p:nvPr/>
-        </p:nvPicPr>
-        <p:blipFill>
-          <a:blip r:embed="rId3"/>
-          <a:stretch>
-            <a:fillRect/>
-          </a:stretch>
-        </p:blipFill>
-        <p:spPr>
-          <a:xfrm>
-            <a:off x="87185" y="2004436"/>
-            <a:ext cx="3577288" cy="4795925"/>
-          </a:xfrm>
-          <a:prstGeom prst="rect">
-            <a:avLst/>
-          </a:prstGeom>
-          <a:ln>
-            <a:noFill/>
-          </a:ln>
-          <a:effectLst>
-            <a:outerShdw blurRad="292100" dist="139700" dir="2700000" algn="tl" rotWithShape="0">
-              <a:srgbClr val="333333">
-                <a:alpha val="65000"/>
-              </a:srgbClr>
-            </a:outerShdw>
-          </a:effectLst>
-        </p:spPr>
-      </p:pic>
-      <p:pic>
-        <p:nvPicPr>
-          <p:cNvPr id="4" name="Рисунок 3">
-            <a:extLst>
-              <a:ext uri="{FF2B5EF4-FFF2-40B4-BE49-F238E27FC236}">
-                <a16:creationId xmlns:a16="http://schemas.microsoft.com/office/drawing/2014/main" id="{3660F798-212C-D4E2-EB0B-051BF96B4D69}"/>
-              </a:ext>
-            </a:extLst>
-          </p:cNvPr>
-          <p:cNvPicPr>
-            <a:picLocks noChangeAspect="1"/>
-          </p:cNvPicPr>
-          <p:nvPr/>
-        </p:nvPicPr>
-        <p:blipFill>
-          <a:blip r:embed="rId4"/>
-          <a:stretch>
-            <a:fillRect/>
-          </a:stretch>
-        </p:blipFill>
-        <p:spPr>
-          <a:xfrm>
-            <a:off x="3414816" y="1985814"/>
-            <a:ext cx="5060268" cy="4795925"/>
-          </a:xfrm>
-          <a:prstGeom prst="rect">
-            <a:avLst/>
-          </a:prstGeom>
-          <a:ln>
-            <a:noFill/>
-          </a:ln>
-          <a:effectLst>
-            <a:outerShdw blurRad="292100" dist="139700" dir="2700000" algn="tl" rotWithShape="0">
-              <a:srgbClr val="333333">
-                <a:alpha val="65000"/>
-              </a:srgbClr>
-            </a:outerShdw>
-          </a:effectLst>
-        </p:spPr>
-      </p:pic>
-      <p:pic>
-        <p:nvPicPr>
-          <p:cNvPr id="5" name="Рисунок 4">
-            <a:extLst>
-              <a:ext uri="{FF2B5EF4-FFF2-40B4-BE49-F238E27FC236}">
-                <a16:creationId xmlns:a16="http://schemas.microsoft.com/office/drawing/2014/main" id="{B5B09193-F8C4-D98D-10CF-0EE83BE2CD1C}"/>
-              </a:ext>
-            </a:extLst>
-          </p:cNvPr>
-          <p:cNvPicPr>
-            <a:picLocks noChangeAspect="1"/>
-          </p:cNvPicPr>
-          <p:nvPr/>
-        </p:nvPicPr>
-        <p:blipFill>
-          <a:blip r:embed="rId5"/>
-          <a:stretch>
-            <a:fillRect/>
-          </a:stretch>
-        </p:blipFill>
-        <p:spPr>
-          <a:xfrm>
-            <a:off x="8069551" y="1967192"/>
-            <a:ext cx="4035264" cy="4765597"/>
-          </a:xfrm>
-          <a:prstGeom prst="rect">
-            <a:avLst/>
-          </a:prstGeom>
-          <a:ln>
-            <a:noFill/>
-          </a:ln>
-          <a:effectLst>
-            <a:outerShdw blurRad="292100" dist="139700" dir="2700000" algn="tl" rotWithShape="0">
-              <a:srgbClr val="333333">
-                <a:alpha val="65000"/>
-              </a:srgbClr>
-            </a:outerShdw>
-          </a:effectLst>
-        </p:spPr>
-      </p:pic>
+            <a:pPr algn="just"/>
+            <a:r>
+              <a:rPr lang="ru-RU" sz="3200" b="1" dirty="0">
+                <a:solidFill>
+                  <a:schemeClr val="accent6"/>
+                </a:solidFill>
+              </a:rPr>
+              <a:t>Файл </a:t>
+            </a:r>
+            <a:r>
+              <a:rPr lang="en-US" sz="3200" b="1" dirty="0">
+                <a:solidFill>
+                  <a:schemeClr val="accent6"/>
+                </a:solidFill>
+              </a:rPr>
+              <a:t>main.py</a:t>
+            </a:r>
+            <a:r>
+              <a:rPr lang="ru-RU" sz="3200" b="1" dirty="0">
+                <a:solidFill>
+                  <a:schemeClr val="accent6"/>
+                </a:solidFill>
+              </a:rPr>
+              <a:t> – это основной файл, росписи функций для кнопок </a:t>
+            </a:r>
+            <a:r>
+              <a:rPr lang="en-US" sz="3200" b="1" dirty="0">
+                <a:solidFill>
+                  <a:schemeClr val="accent6"/>
+                </a:solidFill>
+              </a:rPr>
+              <a:t>pushbutton </a:t>
+            </a:r>
+            <a:r>
+              <a:rPr lang="ru-RU" sz="3200" b="1" dirty="0">
+                <a:solidFill>
+                  <a:schemeClr val="accent6"/>
+                </a:solidFill>
+              </a:rPr>
+              <a:t>и прочего.</a:t>
+            </a:r>
+          </a:p>
+          <a:p>
+            <a:pPr algn="just"/>
+            <a:r>
+              <a:rPr lang="ru-RU" sz="3200" b="1" dirty="0">
+                <a:solidFill>
+                  <a:schemeClr val="accent6">
+                    <a:lumMod val="75000"/>
+                  </a:schemeClr>
+                </a:solidFill>
+              </a:rPr>
+              <a:t>Файлы </a:t>
+            </a:r>
+            <a:r>
+              <a:rPr lang="en-US" sz="3200" b="1" dirty="0">
+                <a:solidFill>
+                  <a:schemeClr val="accent6">
+                    <a:lumMod val="75000"/>
+                  </a:schemeClr>
+                </a:solidFill>
+              </a:rPr>
+              <a:t>RestoreWindow.py</a:t>
+            </a:r>
+            <a:r>
+              <a:rPr lang="ru-RU" sz="3200" b="1" dirty="0">
+                <a:solidFill>
+                  <a:schemeClr val="accent6">
+                    <a:lumMod val="75000"/>
+                  </a:schemeClr>
+                </a:solidFill>
+              </a:rPr>
+              <a:t>, </a:t>
+            </a:r>
+            <a:r>
+              <a:rPr lang="en-US" sz="3200" b="1" dirty="0">
+                <a:solidFill>
+                  <a:schemeClr val="accent6">
+                    <a:lumMod val="75000"/>
+                  </a:schemeClr>
+                </a:solidFill>
+              </a:rPr>
+              <a:t>NewContactWindow.py – </a:t>
+            </a:r>
+            <a:r>
+              <a:rPr lang="ru-RU" sz="3200" b="1" dirty="0">
+                <a:solidFill>
+                  <a:schemeClr val="accent6">
+                    <a:lumMod val="75000"/>
+                  </a:schemeClr>
+                </a:solidFill>
+              </a:rPr>
+              <a:t>это файлы дизайна каждого окна, всего окон 6</a:t>
+            </a:r>
+          </a:p>
+          <a:p>
+            <a:pPr algn="just"/>
+            <a:r>
+              <a:rPr lang="ru-RU" sz="3200" b="1" dirty="0">
+                <a:solidFill>
+                  <a:schemeClr val="accent6">
+                    <a:lumMod val="50000"/>
+                  </a:schemeClr>
+                </a:solidFill>
+              </a:rPr>
+              <a:t>Файл </a:t>
+            </a:r>
+            <a:r>
+              <a:rPr lang="en-US" sz="3200" b="1" dirty="0">
+                <a:solidFill>
+                  <a:schemeClr val="accent6">
+                    <a:lumMod val="50000"/>
+                  </a:schemeClr>
+                </a:solidFill>
+              </a:rPr>
+              <a:t>config.py </a:t>
+            </a:r>
+            <a:r>
+              <a:rPr lang="ru-RU" sz="3200" b="1" dirty="0">
+                <a:solidFill>
+                  <a:schemeClr val="accent6">
+                    <a:lumMod val="50000"/>
+                  </a:schemeClr>
+                </a:solidFill>
+              </a:rPr>
+              <a:t>отвечает за подсоединение базы данных </a:t>
+            </a:r>
+            <a:r>
+              <a:rPr lang="en-US" sz="3200" b="1" dirty="0">
+                <a:solidFill>
+                  <a:schemeClr val="accent6">
+                    <a:lumMod val="50000"/>
+                  </a:schemeClr>
+                </a:solidFill>
+              </a:rPr>
+              <a:t>MySQL</a:t>
+            </a:r>
+            <a:r>
+              <a:rPr lang="ru-RU" sz="3200" b="1" dirty="0">
+                <a:solidFill>
+                  <a:schemeClr val="accent6">
+                    <a:lumMod val="50000"/>
+                  </a:schemeClr>
+                </a:solidFill>
+              </a:rPr>
+              <a:t>, а именно </a:t>
+            </a:r>
+            <a:r>
+              <a:rPr lang="en-US" sz="3200" b="1" dirty="0">
+                <a:solidFill>
+                  <a:schemeClr val="accent6">
+                    <a:lumMod val="50000"/>
+                  </a:schemeClr>
+                </a:solidFill>
+              </a:rPr>
+              <a:t>MariaDB</a:t>
+            </a:r>
+          </a:p>
+        </p:txBody>
+      </p:sp>
     </p:spTree>
     <p:extLst>
       <p:ext uri="{BB962C8B-B14F-4D97-AF65-F5344CB8AC3E}">
-        <p14:creationId xmlns:p14="http://schemas.microsoft.com/office/powerpoint/2010/main" val="440862562"/>
+        <p14:creationId xmlns:p14="http://schemas.microsoft.com/office/powerpoint/2010/main" val="1229096311"/>
       </p:ext>
     </p:extLst>
   </p:cSld>
@@ -8362,7 +9572,7 @@
         </p:nvSpPr>
         <p:spPr>
           <a:xfrm>
-            <a:off x="467026" y="246491"/>
+            <a:off x="470877" y="431995"/>
             <a:ext cx="10948147" cy="1121135"/>
           </a:xfrm>
         </p:spPr>
@@ -8373,15 +9583,52 @@
           <a:lstStyle/>
           <a:p>
             <a:pPr algn="ctr"/>
-            <a:r>
+            <a:br>
               <a:rPr lang="ru-RU" sz="4800" b="1" dirty="0">
                 <a:solidFill>
+                  <a:schemeClr val="accent5">
+                    <a:lumMod val="60000"/>
+                    <a:lumOff val="40000"/>
+                  </a:schemeClr>
+                </a:solidFill>
+              </a:rPr>
+            </a:br>
+            <a:r>
+              <a:rPr lang="ru-RU" sz="4800" b="1" dirty="0">
+                <a:solidFill>
                   <a:srgbClr val="F4B183"/>
                 </a:solidFill>
                 <a:latin typeface="Arial Black" panose="020B0A04020102020204" pitchFamily="34" charset="0"/>
               </a:rPr>
               <a:t>Объяснение реализации проекта в коде</a:t>
             </a:r>
+            <a:br>
+              <a:rPr lang="ru-RU" sz="4800" b="1" dirty="0">
+                <a:solidFill>
+                  <a:srgbClr val="F4B183"/>
+                </a:solidFill>
+                <a:latin typeface="Arial Black" panose="020B0A04020102020204" pitchFamily="34" charset="0"/>
+              </a:rPr>
+            </a:br>
+            <a:r>
+              <a:rPr lang="en-US" sz="4800" b="1" dirty="0" err="1">
+                <a:solidFill>
+                  <a:srgbClr val="F4B183"/>
+                </a:solidFill>
+                <a:latin typeface="Arial Black" panose="020B0A04020102020204" pitchFamily="34" charset="0"/>
+              </a:rPr>
+              <a:t>Descrypt_and_Encrypt</a:t>
+            </a:r>
+            <a:br>
+              <a:rPr lang="ru-RU" sz="4800" b="1" dirty="0">
+                <a:solidFill>
+                  <a:schemeClr val="accent5">
+                    <a:lumMod val="60000"/>
+                    <a:lumOff val="40000"/>
+                  </a:schemeClr>
+                </a:solidFill>
+              </a:rPr>
+            </a:br>
             <a:endParaRPr lang="ru-RU" sz="4800" b="1" dirty="0">
               <a:solidFill>
                 <a:schemeClr val="accent2">
@@ -8401,21 +9648,55 @@
           </a:p>
         </p:txBody>
       </p:sp>
-      <p:pic>
-        <p:nvPicPr>
-          <p:cNvPr id="8" name="Объект 7">
-            <a:extLst>
-              <a:ext uri="{FF2B5EF4-FFF2-40B4-BE49-F238E27FC236}">
-                <a16:creationId xmlns:a16="http://schemas.microsoft.com/office/drawing/2014/main" id="{BB23FC14-7BE2-BD4D-7FD9-A206B214C100}"/>
-              </a:ext>
-            </a:extLst>
-          </p:cNvPr>
-          <p:cNvPicPr>
-            <a:picLocks noGrp="1" noChangeAspect="1"/>
-          </p:cNvPicPr>
+      <p:sp>
+        <p:nvSpPr>
+          <p:cNvPr id="3" name="Объект 2">
+            <a:extLst>
+              <a:ext uri="{FF2B5EF4-FFF2-40B4-BE49-F238E27FC236}">
+                <a16:creationId xmlns:a16="http://schemas.microsoft.com/office/drawing/2014/main" id="{5C13B368-D937-BC3A-5BE3-E284717B6839}"/>
+              </a:ext>
+            </a:extLst>
+          </p:cNvPr>
+          <p:cNvSpPr>
+            <a:spLocks noGrp="1"/>
+          </p:cNvSpPr>
           <p:nvPr>
             <p:ph idx="1"/>
           </p:nvPr>
+        </p:nvSpPr>
+        <p:spPr>
+          <a:xfrm>
+            <a:off x="470877" y="2411779"/>
+            <a:ext cx="10515600" cy="4351338"/>
+          </a:xfrm>
+        </p:spPr>
+        <p:txBody>
+          <a:bodyPr>
+            <a:normAutofit/>
+          </a:bodyPr>
+          <a:lstStyle/>
+          <a:p>
+            <a:endParaRPr lang="ru-RU" sz="3200" b="1" dirty="0">
+              <a:solidFill>
+                <a:srgbClr val="DD5FC3"/>
+              </a:solidFill>
+            </a:endParaRPr>
+          </a:p>
+        </p:txBody>
+      </p:sp>
+      <p:pic>
+        <p:nvPicPr>
+          <p:cNvPr id="6" name="Объект 6">
+            <a:extLst>
+              <a:ext uri="{FF2B5EF4-FFF2-40B4-BE49-F238E27FC236}">
+                <a16:creationId xmlns:a16="http://schemas.microsoft.com/office/drawing/2014/main" id="{C3F07C1C-0F3E-7329-0D3B-C3145BF52061}"/>
+              </a:ext>
+            </a:extLst>
+          </p:cNvPr>
+          <p:cNvPicPr>
+            <a:picLocks noChangeAspect="1"/>
+          </p:cNvPicPr>
+          <p:nvPr/>
         </p:nvPicPr>
         <p:blipFill>
           <a:blip r:embed="rId3"/>
@@ -8425,33 +9706,30 @@
         </p:blipFill>
         <p:spPr>
           <a:xfrm>
-            <a:off x="381519" y="1764658"/>
-            <a:ext cx="4314825" cy="1733550"/>
+            <a:off x="87185" y="2004436"/>
+            <a:ext cx="3577288" cy="4795925"/>
           </a:xfrm>
-          <a:prstGeom prst="roundRect">
-            <a:avLst>
-              <a:gd name="adj" fmla="val 8594"/>
-            </a:avLst>
+          <a:prstGeom prst="rect">
+            <a:avLst/>
           </a:prstGeom>
-          <a:solidFill>
-            <a:srgbClr val="FFFFFF">
-              <a:shade val="85000"/>
-            </a:srgbClr>
-          </a:solidFill>
           <a:ln>
             <a:noFill/>
           </a:ln>
           <a:effectLst>
-            <a:reflection blurRad="12700" stA="38000" endPos="28000" dist="5000" dir="5400000" sy="-100000" algn="bl" rotWithShape="0"/>
+            <a:outerShdw blurRad="292100" dist="139700" dir="2700000" algn="tl" rotWithShape="0">
+              <a:srgbClr val="333333">
+                <a:alpha val="65000"/>
+              </a:srgbClr>
+            </a:outerShdw>
           </a:effectLst>
         </p:spPr>
       </p:pic>
       <p:pic>
         <p:nvPicPr>
-          <p:cNvPr id="10" name="Рисунок 9">
-            <a:extLst>
-              <a:ext uri="{FF2B5EF4-FFF2-40B4-BE49-F238E27FC236}">
-                <a16:creationId xmlns:a16="http://schemas.microsoft.com/office/drawing/2014/main" id="{3F350791-AE4B-E6A9-B5A8-6D0906073CA2}"/>
+          <p:cNvPr id="4" name="Рисунок 3">
+            <a:extLst>
+              <a:ext uri="{FF2B5EF4-FFF2-40B4-BE49-F238E27FC236}">
+                <a16:creationId xmlns:a16="http://schemas.microsoft.com/office/drawing/2014/main" id="{3660F798-212C-D4E2-EB0B-051BF96B4D69}"/>
               </a:ext>
             </a:extLst>
           </p:cNvPr>
@@ -8468,33 +9746,30 @@
         </p:blipFill>
         <p:spPr>
           <a:xfrm>
-            <a:off x="4905375" y="1781354"/>
-            <a:ext cx="7286625" cy="3895725"/>
+            <a:off x="3414816" y="1985814"/>
+            <a:ext cx="5060268" cy="4795925"/>
           </a:xfrm>
-          <a:prstGeom prst="roundRect">
-            <a:avLst>
-              <a:gd name="adj" fmla="val 8594"/>
-            </a:avLst>
+          <a:prstGeom prst="rect">
+            <a:avLst/>
           </a:prstGeom>
-          <a:solidFill>
-            <a:srgbClr val="FFFFFF">
-              <a:shade val="85000"/>
-            </a:srgbClr>
-          </a:solidFill>
           <a:ln>
             <a:noFill/>
           </a:ln>
           <a:effectLst>
-            <a:reflection blurRad="12700" stA="38000" endPos="28000" dist="5000" dir="5400000" sy="-100000" algn="bl" rotWithShape="0"/>
+            <a:outerShdw blurRad="292100" dist="139700" dir="2700000" algn="tl" rotWithShape="0">
+              <a:srgbClr val="333333">
+                <a:alpha val="65000"/>
+              </a:srgbClr>
+            </a:outerShdw>
           </a:effectLst>
         </p:spPr>
       </p:pic>
       <p:pic>
         <p:nvPicPr>
-          <p:cNvPr id="12" name="Рисунок 11">
-            <a:extLst>
-              <a:ext uri="{FF2B5EF4-FFF2-40B4-BE49-F238E27FC236}">
-                <a16:creationId xmlns:a16="http://schemas.microsoft.com/office/drawing/2014/main" id="{368CB8D0-B18F-8995-11F5-389B44BB763D}"/>
+          <p:cNvPr id="5" name="Рисунок 4">
+            <a:extLst>
+              <a:ext uri="{FF2B5EF4-FFF2-40B4-BE49-F238E27FC236}">
+                <a16:creationId xmlns:a16="http://schemas.microsoft.com/office/drawing/2014/main" id="{B5B09193-F8C4-D98D-10CF-0EE83BE2CD1C}"/>
               </a:ext>
             </a:extLst>
           </p:cNvPr>
@@ -8511,87 +9786,41 @@
         </p:blipFill>
         <p:spPr>
           <a:xfrm>
-            <a:off x="363659" y="3577721"/>
-            <a:ext cx="3314700" cy="1162050"/>
+            <a:off x="8069551" y="1967192"/>
+            <a:ext cx="4035264" cy="4765597"/>
           </a:xfrm>
-          <a:prstGeom prst="roundRect">
-            <a:avLst>
-              <a:gd name="adj" fmla="val 8594"/>
-            </a:avLst>
+          <a:prstGeom prst="rect">
+            <a:avLst/>
           </a:prstGeom>
-          <a:solidFill>
-            <a:srgbClr val="FFFFFF">
-              <a:shade val="85000"/>
-            </a:srgbClr>
-          </a:solidFill>
           <a:ln>
             <a:noFill/>
           </a:ln>
           <a:effectLst>
-            <a:reflection blurRad="12700" stA="38000" endPos="28000" dist="5000" dir="5400000" sy="-100000" algn="bl" rotWithShape="0"/>
-          </a:effectLst>
-        </p:spPr>
-      </p:pic>
-      <p:pic>
-        <p:nvPicPr>
-          <p:cNvPr id="14" name="Рисунок 13">
-            <a:extLst>
-              <a:ext uri="{FF2B5EF4-FFF2-40B4-BE49-F238E27FC236}">
-                <a16:creationId xmlns:a16="http://schemas.microsoft.com/office/drawing/2014/main" id="{2CDEA45F-027F-6E84-5C3B-2452F66CA562}"/>
-              </a:ext>
-            </a:extLst>
-          </p:cNvPr>
-          <p:cNvPicPr>
-            <a:picLocks noChangeAspect="1"/>
-          </p:cNvPicPr>
-          <p:nvPr/>
-        </p:nvPicPr>
-        <p:blipFill>
-          <a:blip r:embed="rId6"/>
-          <a:stretch>
-            <a:fillRect/>
-          </a:stretch>
-        </p:blipFill>
-        <p:spPr>
-          <a:xfrm>
-            <a:off x="363659" y="4819284"/>
-            <a:ext cx="4476750" cy="866775"/>
-          </a:xfrm>
-          <a:prstGeom prst="roundRect">
-            <a:avLst>
-              <a:gd name="adj" fmla="val 8594"/>
-            </a:avLst>
-          </a:prstGeom>
-          <a:solidFill>
-            <a:srgbClr val="FFFFFF">
-              <a:shade val="85000"/>
-            </a:srgbClr>
-          </a:solidFill>
-          <a:ln>
-            <a:noFill/>
-          </a:ln>
-          <a:effectLst>
-            <a:reflection blurRad="12700" stA="38000" endPos="28000" dist="5000" dir="5400000" sy="-100000" algn="bl" rotWithShape="0"/>
+            <a:outerShdw blurRad="292100" dist="139700" dir="2700000" algn="tl" rotWithShape="0">
+              <a:srgbClr val="333333">
+                <a:alpha val="65000"/>
+              </a:srgbClr>
+            </a:outerShdw>
           </a:effectLst>
         </p:spPr>
       </p:pic>
     </p:spTree>
     <p:extLst>
       <p:ext uri="{BB962C8B-B14F-4D97-AF65-F5344CB8AC3E}">
-        <p14:creationId xmlns:p14="http://schemas.microsoft.com/office/powerpoint/2010/main" val="498477423"/>
+        <p14:creationId xmlns:p14="http://schemas.microsoft.com/office/powerpoint/2010/main" val="440862562"/>
       </p:ext>
     </p:extLst>
   </p:cSld>
   <p:clrMapOvr>
     <a:masterClrMapping/>
   </p:clrMapOvr>
-  <mc:AlternateContent xmlns:mc="http://schemas.openxmlformats.org/markup-compatibility/2006">
-    <mc:Choice xmlns:p14="http://schemas.microsoft.com/office/powerpoint/2010/main" Requires="p14">
+  <mc:AlternateContent xmlns:mc="http://schemas.openxmlformats.org/markup-compatibility/2006" xmlns:p14="http://schemas.microsoft.com/office/powerpoint/2010/main">
+    <mc:Choice Requires="p14">
       <p:transition spd="slow" p14:dur="1600">
         <p14:prism isContent="1" isInverted="1"/>
       </p:transition>
     </mc:Choice>
-    <mc:Fallback>
+    <mc:Fallback xmlns="">
       <p:transition spd="slow">
         <p:fade/>
       </p:transition>

</xml_diff>